<commit_message>
Fine Tuned Final project
</commit_message>
<xml_diff>
--- a/Predicting Poke Legends .pptx
+++ b/Predicting Poke Legends .pptx
@@ -21,21 +21,21 @@
   <p:notesSz cx="6858000" cy="9144000"/>
   <p:embeddedFontLst>
     <p:embeddedFont>
-      <p:font typeface="Lato" panose="020B0604020202020204" charset="0"/>
+      <p:font typeface="Lato" panose="020F0502020204030203" pitchFamily="34" charset="77"/>
       <p:regular r:id="rId11"/>
       <p:bold r:id="rId12"/>
       <p:italic r:id="rId13"/>
       <p:boldItalic r:id="rId14"/>
     </p:embeddedFont>
     <p:embeddedFont>
-      <p:font typeface="Montserrat" panose="020B0604020202020204" charset="0"/>
+      <p:font typeface="Montserrat" pitchFamily="2" charset="77"/>
       <p:regular r:id="rId15"/>
       <p:bold r:id="rId16"/>
       <p:italic r:id="rId17"/>
       <p:boldItalic r:id="rId18"/>
     </p:embeddedFont>
     <p:embeddedFont>
-      <p:font typeface="Roboto" panose="020B0604020202020204" charset="0"/>
+      <p:font typeface="Roboto" panose="02000000000000000000" pitchFamily="2" charset="0"/>
       <p:regular r:id="rId19"/>
       <p:bold r:id="rId20"/>
       <p:italic r:id="rId21"/>
@@ -2491,9 +2491,9 @@
     <dgm:cxn modelId="{8F716117-725C-4BF3-9C9F-9FAB029CC9EC}" srcId="{5781A606-B379-4F95-A7BA-55AF26A1928B}" destId="{0ED8609D-C324-4E08-B9AE-D9B82246A114}" srcOrd="1" destOrd="0" parTransId="{F9E8D797-655E-49F7-BD8C-2FD4B89FCC87}" sibTransId="{F04CC6F8-E3DD-48C8-B3DE-B20954D781B5}"/>
     <dgm:cxn modelId="{D719312E-2685-4C77-9627-7591ED575957}" srcId="{43107294-DBA4-492B-A268-8B8AE290B081}" destId="{59764C42-D62D-41F4-AB9E-B9D470FB3E0E}" srcOrd="0" destOrd="0" parTransId="{889363E0-E543-48F0-9426-2D1A730B1E5A}" sibTransId="{455F06D5-50DD-42EB-8EF6-B78CA7BBB979}"/>
     <dgm:cxn modelId="{16617F38-3ACB-4760-9BF4-5ADB70C3C71F}" srcId="{43107294-DBA4-492B-A268-8B8AE290B081}" destId="{971C462C-0169-41B3-8BB9-A20436E3BCD5}" srcOrd="3" destOrd="0" parTransId="{8B94E68F-357A-4474-B7AF-DCE94D7F26D5}" sibTransId="{AAC5E1BA-1E7A-4B08-B461-C93A9D35D5B1}"/>
+    <dgm:cxn modelId="{6D363952-AF8A-42BF-8C80-384E5C451E20}" type="presOf" srcId="{138DBAD0-C467-48D3-A169-79E4F2877E98}" destId="{FE4BF343-16C9-4A66-9D9A-6563BB769F2B}" srcOrd="0" destOrd="0" presId="urn:microsoft.com/office/officeart/2005/8/layout/StepDownProcess"/>
     <dgm:cxn modelId="{8736DD5F-DC21-47C3-A2F1-F0D611C16054}" type="presOf" srcId="{43107294-DBA4-492B-A268-8B8AE290B081}" destId="{3A4F9F58-7416-4C1E-A788-AA199B64B40F}" srcOrd="0" destOrd="0" presId="urn:microsoft.com/office/officeart/2005/8/layout/StepDownProcess"/>
     <dgm:cxn modelId="{EFE95F6E-FC8B-4258-9124-FC4C964FFEA5}" srcId="{59764C42-D62D-41F4-AB9E-B9D470FB3E0E}" destId="{D67D522A-0A1A-4000-A94A-1BE71D7CDB57}" srcOrd="1" destOrd="0" parTransId="{81C35EB2-1F9F-4962-8CC2-F7B3D34B32AC}" sibTransId="{37E76203-8F05-4F0B-90A7-4AC0CE81D8E3}"/>
-    <dgm:cxn modelId="{6D363952-AF8A-42BF-8C80-384E5C451E20}" type="presOf" srcId="{138DBAD0-C467-48D3-A169-79E4F2877E98}" destId="{FE4BF343-16C9-4A66-9D9A-6563BB769F2B}" srcOrd="0" destOrd="0" presId="urn:microsoft.com/office/officeart/2005/8/layout/StepDownProcess"/>
     <dgm:cxn modelId="{EE758578-D66B-4809-9519-7776FFF60F92}" type="presOf" srcId="{6E6B36ED-D431-452A-9EBB-03B3991AF9A9}" destId="{5DE5EA96-D807-4DA8-B23A-19E8C718D390}" srcOrd="0" destOrd="0" presId="urn:microsoft.com/office/officeart/2005/8/layout/StepDownProcess"/>
     <dgm:cxn modelId="{D9E99879-1A6A-4449-A564-65A7F5D43433}" type="presOf" srcId="{0EE7EE6B-0BE1-4123-85E4-EF17D93E42D1}" destId="{1907D297-084C-4FEF-8815-93DC9BC7A6F7}" srcOrd="0" destOrd="0" presId="urn:microsoft.com/office/officeart/2005/8/layout/StepDownProcess"/>
     <dgm:cxn modelId="{DC218B7C-12BB-445D-9832-F0135D171B86}" srcId="{0EE7EE6B-0BE1-4123-85E4-EF17D93E42D1}" destId="{6E6B36ED-D431-452A-9EBB-03B3991AF9A9}" srcOrd="0" destOrd="0" parTransId="{7108A13E-8588-4E28-A7A0-CAE4493C3F86}" sibTransId="{B0218B75-44F8-42B2-AC5D-3EFA712E6F68}"/>
@@ -2749,7 +2749,7 @@
                 <a:schemeClr val="bg1"/>
               </a:solidFill>
             </a:rPr>
-            <a:t>Score: - .04</a:t>
+            <a:t>Score:  .04</a:t>
           </a:r>
         </a:p>
       </dgm:t>
@@ -2869,7 +2869,7 @@
                 <a:schemeClr val="bg1"/>
               </a:solidFill>
             </a:rPr>
-            <a:t>Training Score: ~95%</a:t>
+            <a:t>Training Score: ~99%</a:t>
           </a:r>
         </a:p>
       </dgm:t>
@@ -2909,7 +2909,7 @@
                 <a:schemeClr val="bg1"/>
               </a:solidFill>
             </a:rPr>
-            <a:t>Testing Score: ~90%</a:t>
+            <a:t>Testing Score: ~93%</a:t>
           </a:r>
         </a:p>
       </dgm:t>
@@ -3064,11 +3064,11 @@
     <dgm:cxn modelId="{E70E3A1A-FC62-48BF-80DC-EA681646A9CF}" srcId="{1453BA9F-620D-4148-B913-0F5694191677}" destId="{A7B9F662-9CF1-4AFE-9660-43785DA6B37F}" srcOrd="1" destOrd="0" parTransId="{B1079897-5CCA-4049-98CF-1CF0966CA4DF}" sibTransId="{09F5C22F-6F95-4DBD-B0F1-CF7357B787D1}"/>
     <dgm:cxn modelId="{C7F9A91A-56D6-40D3-B443-AE406F2D4216}" srcId="{9FCCC602-9CFF-44F6-81F0-B7CBC695F99D}" destId="{A2D448CA-30F6-45FD-9144-76D108619F6B}" srcOrd="1" destOrd="0" parTransId="{FD653B95-2828-4503-99A3-F520728D14AA}" sibTransId="{DD876363-BE08-44CF-AB47-4CA47F78A275}"/>
     <dgm:cxn modelId="{06D9D131-5448-4D9D-A1E7-210FDA6CF044}" type="presOf" srcId="{9FCCC602-9CFF-44F6-81F0-B7CBC695F99D}" destId="{A30A6E96-C59D-45DA-88B0-CC454E778904}" srcOrd="0" destOrd="0" presId="urn:microsoft.com/office/officeart/2005/8/layout/vList2"/>
+    <dgm:cxn modelId="{7D404A48-762D-457F-B8D0-10BE7D248975}" type="presOf" srcId="{1453BA9F-620D-4148-B913-0F5694191677}" destId="{25AF6301-9BC0-495C-AF14-4BEADD9E2044}" srcOrd="0" destOrd="0" presId="urn:microsoft.com/office/officeart/2005/8/layout/vList2"/>
+    <dgm:cxn modelId="{D741BD58-C5B3-422A-A926-ECA2995277B4}" srcId="{382E9DF0-CDDB-449E-A996-2EB163D8FFC5}" destId="{99B75AB7-323E-45D3-8741-0B80FBA21D57}" srcOrd="0" destOrd="0" parTransId="{B041DFE5-57A4-4F4D-8328-FF769B8F1AA4}" sibTransId="{321BD7E8-8A55-4864-9437-46534E0A3263}"/>
     <dgm:cxn modelId="{DCCF3C60-8B53-462F-A2FE-D8FB51166577}" srcId="{F94410D4-1E8F-4D5A-BE35-418FD65DE9C6}" destId="{C44B431E-6060-4C91-B4BF-18F834BC519A}" srcOrd="0" destOrd="0" parTransId="{F6EF2168-65CE-4119-A4A3-0C8A7435D89F}" sibTransId="{270F2860-8C6A-4347-8DF9-84D1325BBAEF}"/>
     <dgm:cxn modelId="{96A07560-E3C8-4D01-ACF3-86BB1E655F98}" srcId="{382E9DF0-CDDB-449E-A996-2EB163D8FFC5}" destId="{960BA9AF-D7F8-401B-981D-2427B59A48C4}" srcOrd="1" destOrd="0" parTransId="{ADC0DBA8-11AC-4698-86CC-5B7FCE7E3D76}" sibTransId="{0A021306-A7A1-478E-934F-C328E4AFDD6C}"/>
-    <dgm:cxn modelId="{7D404A48-762D-457F-B8D0-10BE7D248975}" type="presOf" srcId="{1453BA9F-620D-4148-B913-0F5694191677}" destId="{25AF6301-9BC0-495C-AF14-4BEADD9E2044}" srcOrd="0" destOrd="0" presId="urn:microsoft.com/office/officeart/2005/8/layout/vList2"/>
     <dgm:cxn modelId="{45CA4377-A23F-487B-B815-3D9E86E31F38}" srcId="{1453BA9F-620D-4148-B913-0F5694191677}" destId="{372CE356-3F98-447A-ACA8-48F0E1D6CFBA}" srcOrd="2" destOrd="0" parTransId="{10B24253-AA34-45DA-8C6B-68B7AD7E9F1E}" sibTransId="{6C8083E1-5EB4-41B9-AED8-7FF8487EB908}"/>
-    <dgm:cxn modelId="{D741BD58-C5B3-422A-A926-ECA2995277B4}" srcId="{382E9DF0-CDDB-449E-A996-2EB163D8FFC5}" destId="{99B75AB7-323E-45D3-8741-0B80FBA21D57}" srcOrd="0" destOrd="0" parTransId="{B041DFE5-57A4-4F4D-8328-FF769B8F1AA4}" sibTransId="{321BD7E8-8A55-4864-9437-46534E0A3263}"/>
     <dgm:cxn modelId="{B546497D-3F4A-484D-8D83-F4D331A9CCFC}" srcId="{C8A860BA-F204-433F-ACD4-C54B5CFC836A}" destId="{9FCCC602-9CFF-44F6-81F0-B7CBC695F99D}" srcOrd="0" destOrd="0" parTransId="{B5C9E444-723C-482A-BBDA-16B930CAED01}" sibTransId="{E200EAC6-D792-4E6F-B9B4-0540E2745F7B}"/>
     <dgm:cxn modelId="{41FF3089-D776-4081-8A3A-1F81E0DBD1DE}" type="presOf" srcId="{382E9DF0-CDDB-449E-A996-2EB163D8FFC5}" destId="{A88462B2-75B5-44A5-AE57-2175E87B3D72}" srcOrd="0" destOrd="0" presId="urn:microsoft.com/office/officeart/2005/8/layout/vList2"/>
     <dgm:cxn modelId="{32F59E89-39A8-4768-BD16-1AACE49B21D0}" srcId="{C8A860BA-F204-433F-ACD4-C54B5CFC836A}" destId="{1453BA9F-620D-4148-B913-0F5694191677}" srcOrd="1" destOrd="0" parTransId="{E829E584-DBE1-43E2-8379-D7E034D378C9}" sibTransId="{277A96A4-A431-4412-8DDF-EAEAB3ADDFC6}"/>
@@ -4263,7 +4263,7 @@
                 <a:schemeClr val="bg1"/>
               </a:solidFill>
             </a:rPr>
-            <a:t>Score: - .04</a:t>
+            <a:t>Score:  .04</a:t>
           </a:r>
         </a:p>
         <a:p>
@@ -4496,7 +4496,7 @@
                 <a:schemeClr val="bg1"/>
               </a:solidFill>
             </a:rPr>
-            <a:t>Training Score: ~95%</a:t>
+            <a:t>Training Score: ~99%</a:t>
           </a:r>
         </a:p>
         <a:p>
@@ -4518,7 +4518,7 @@
                 <a:schemeClr val="bg1"/>
               </a:solidFill>
             </a:rPr>
-            <a:t>Testing Score: ~90%</a:t>
+            <a:t>Testing Score: ~93%</a:t>
           </a:r>
         </a:p>
         <a:p>
@@ -8253,7 +8253,7 @@
               </a:spcAft>
               <a:buNone/>
             </a:pPr>
-            <a:endParaRPr/>
+            <a:endParaRPr dirty="0"/>
           </a:p>
         </p:txBody>
       </p:sp>
@@ -15046,7 +15046,7 @@
         </p:nvSpPr>
         <p:spPr>
           <a:xfrm>
-            <a:off x="1670102" y="2750756"/>
+            <a:off x="1670102" y="2785480"/>
             <a:ext cx="5803795" cy="738664"/>
           </a:xfrm>
           <a:prstGeom prst="rect">
@@ -15415,7 +15415,7 @@
             </a:r>
             <a:r>
               <a:rPr lang="en-US" sz="4000" dirty="0" err="1"/>
-              <a:t>pokemon</a:t>
+              <a:t>Pokemon</a:t>
             </a:r>
             <a:r>
               <a:rPr lang="en-US" sz="4000" dirty="0"/>
@@ -15776,13 +15776,13 @@
           <p:nvPr>
             <p:extLst>
               <p:ext uri="{D42A27DB-BD31-4B8C-83A1-F6EECF244321}">
-                <p14:modId xmlns:p14="http://schemas.microsoft.com/office/powerpoint/2010/main" val="3736062979"/>
+                <p14:modId xmlns:p14="http://schemas.microsoft.com/office/powerpoint/2010/main" val="801962031"/>
               </p:ext>
             </p:extLst>
           </p:nvPr>
         </p:nvGraphicFramePr>
         <p:xfrm>
-          <a:off x="-1035313" y="738191"/>
+          <a:off x="-1012164" y="761340"/>
           <a:ext cx="10421138" cy="4274918"/>
         </p:xfrm>
         <a:graphic>
@@ -15960,7 +15960,7 @@
           <p:nvPr>
             <p:extLst>
               <p:ext uri="{D42A27DB-BD31-4B8C-83A1-F6EECF244321}">
-                <p14:modId xmlns:p14="http://schemas.microsoft.com/office/powerpoint/2010/main" val="919290009"/>
+                <p14:modId xmlns:p14="http://schemas.microsoft.com/office/powerpoint/2010/main" val="3381028659"/>
               </p:ext>
             </p:extLst>
           </p:nvPr>

</xml_diff>